<commit_message>
Finalización de la prueba
</commit_message>
<xml_diff>
--- a/prueba_BI/prueba_BI_SCE.pptx
+++ b/prueba_BI/prueba_BI_SCE.pptx
@@ -7,6 +7,8 @@
   <p:sldIdLst>
     <p:sldId id="256" r:id="rId2"/>
     <p:sldId id="257" r:id="rId3"/>
+    <p:sldId id="258" r:id="rId4"/>
+    <p:sldId id="259" r:id="rId5"/>
   </p:sldIdLst>
   <p:sldSz cx="12192000" cy="6858000"/>
   <p:notesSz cx="6858000" cy="9144000"/>
@@ -105,12 +107,18 @@
       </a:defRPr>
     </a:lvl9pPr>
   </p:defaultTextStyle>
+  <p:extLst>
+    <p:ext uri="{EFAFB233-063F-42B5-8137-9DF3F51BA10A}">
+      <p15:sldGuideLst xmlns:p15="http://schemas.microsoft.com/office/powerpoint/2012/main"/>
+    </p:ext>
+  </p:extLst>
 </p:presentation>
 </file>
 
 <file path=ppt/revisionInfo.xml><?xml version="1.0" encoding="utf-8"?>
 <p1510:revInfo xmlns:a="http://schemas.openxmlformats.org/drawingml/2006/main" xmlns:r="http://schemas.openxmlformats.org/officeDocument/2006/relationships" xmlns:p1510="http://schemas.microsoft.com/office/powerpoint/2015/10/main">
   <p1510:revLst>
+    <p1510:client id="{02D278AC-DBDF-48D9-89DD-A7F230D9DF1E}" v="9" dt="2024-02-07T04:27:59.078"/>
     <p1510:client id="{48E6A096-5250-4323-A245-3EC7D997AC32}" v="1" dt="2024-02-06T16:56:17.092"/>
   </p1510:revLst>
 </p1510:revInfo>
@@ -185,6 +193,84 @@
             <ac:graphicFrameMk id="4" creationId="{0428FE7F-74B0-95F4-FD22-BA19E2B08BA3}"/>
           </ac:graphicFrameMkLst>
         </pc:graphicFrameChg>
+      </pc:sldChg>
+    </pc:docChg>
+  </pc:docChgLst>
+  <pc:docChgLst>
+    <pc:chgData name="Sebastian Carmona Estrada" userId="25b17a75-20fd-47cc-aa9d-c0c51ff3a059" providerId="ADAL" clId="{02D278AC-DBDF-48D9-89DD-A7F230D9DF1E}"/>
+    <pc:docChg chg="custSel addSld modSld">
+      <pc:chgData name="Sebastian Carmona Estrada" userId="25b17a75-20fd-47cc-aa9d-c0c51ff3a059" providerId="ADAL" clId="{02D278AC-DBDF-48D9-89DD-A7F230D9DF1E}" dt="2024-02-07T04:27:40.324" v="41" actId="1076"/>
+      <pc:docMkLst>
+        <pc:docMk/>
+      </pc:docMkLst>
+      <pc:sldChg chg="delSp modSp mod">
+        <pc:chgData name="Sebastian Carmona Estrada" userId="25b17a75-20fd-47cc-aa9d-c0c51ff3a059" providerId="ADAL" clId="{02D278AC-DBDF-48D9-89DD-A7F230D9DF1E}" dt="2024-02-07T04:24:40.471" v="3" actId="14100"/>
+        <pc:sldMkLst>
+          <pc:docMk/>
+          <pc:sldMk cId="3940469421" sldId="257"/>
+        </pc:sldMkLst>
+        <pc:spChg chg="del">
+          <ac:chgData name="Sebastian Carmona Estrada" userId="25b17a75-20fd-47cc-aa9d-c0c51ff3a059" providerId="ADAL" clId="{02D278AC-DBDF-48D9-89DD-A7F230D9DF1E}" dt="2024-02-07T04:24:31.111" v="0" actId="478"/>
+          <ac:spMkLst>
+            <pc:docMk/>
+            <pc:sldMk cId="3940469421" sldId="257"/>
+            <ac:spMk id="2" creationId="{515C6F4A-9075-EBFC-2712-CC0798A12208}"/>
+          </ac:spMkLst>
+        </pc:spChg>
+        <pc:graphicFrameChg chg="mod">
+          <ac:chgData name="Sebastian Carmona Estrada" userId="25b17a75-20fd-47cc-aa9d-c0c51ff3a059" providerId="ADAL" clId="{02D278AC-DBDF-48D9-89DD-A7F230D9DF1E}" dt="2024-02-07T04:24:40.471" v="3" actId="14100"/>
+          <ac:graphicFrameMkLst>
+            <pc:docMk/>
+            <pc:sldMk cId="3940469421" sldId="257"/>
+            <ac:graphicFrameMk id="4" creationId="{0428FE7F-74B0-95F4-FD22-BA19E2B08BA3}"/>
+          </ac:graphicFrameMkLst>
+        </pc:graphicFrameChg>
+      </pc:sldChg>
+      <pc:sldChg chg="addSp modSp new mod">
+        <pc:chgData name="Sebastian Carmona Estrada" userId="25b17a75-20fd-47cc-aa9d-c0c51ff3a059" providerId="ADAL" clId="{02D278AC-DBDF-48D9-89DD-A7F230D9DF1E}" dt="2024-02-07T04:27:20.305" v="6" actId="1076"/>
+        <pc:sldMkLst>
+          <pc:docMk/>
+          <pc:sldMk cId="3477497775" sldId="258"/>
+        </pc:sldMkLst>
+        <pc:picChg chg="add mod">
+          <ac:chgData name="Sebastian Carmona Estrada" userId="25b17a75-20fd-47cc-aa9d-c0c51ff3a059" providerId="ADAL" clId="{02D278AC-DBDF-48D9-89DD-A7F230D9DF1E}" dt="2024-02-07T04:27:20.305" v="6" actId="1076"/>
+          <ac:picMkLst>
+            <pc:docMk/>
+            <pc:sldMk cId="3477497775" sldId="258"/>
+            <ac:picMk id="5" creationId="{5CD9E9C9-E4E3-8230-5B93-D91124CAD387}"/>
+          </ac:picMkLst>
+        </pc:picChg>
+      </pc:sldChg>
+      <pc:sldChg chg="delSp modSp add mod">
+        <pc:chgData name="Sebastian Carmona Estrada" userId="25b17a75-20fd-47cc-aa9d-c0c51ff3a059" providerId="ADAL" clId="{02D278AC-DBDF-48D9-89DD-A7F230D9DF1E}" dt="2024-02-07T04:27:40.324" v="41" actId="1076"/>
+        <pc:sldMkLst>
+          <pc:docMk/>
+          <pc:sldMk cId="1384288884" sldId="259"/>
+        </pc:sldMkLst>
+        <pc:spChg chg="del">
+          <ac:chgData name="Sebastian Carmona Estrada" userId="25b17a75-20fd-47cc-aa9d-c0c51ff3a059" providerId="ADAL" clId="{02D278AC-DBDF-48D9-89DD-A7F230D9DF1E}" dt="2024-02-07T04:27:25.948" v="9" actId="478"/>
+          <ac:spMkLst>
+            <pc:docMk/>
+            <pc:sldMk cId="1384288884" sldId="259"/>
+            <ac:spMk id="2" creationId="{B61ECC47-D646-B602-3C25-F1AA5F822408}"/>
+          </ac:spMkLst>
+        </pc:spChg>
+        <pc:spChg chg="mod">
+          <ac:chgData name="Sebastian Carmona Estrada" userId="25b17a75-20fd-47cc-aa9d-c0c51ff3a059" providerId="ADAL" clId="{02D278AC-DBDF-48D9-89DD-A7F230D9DF1E}" dt="2024-02-07T04:27:40.324" v="41" actId="1076"/>
+          <ac:spMkLst>
+            <pc:docMk/>
+            <pc:sldMk cId="1384288884" sldId="259"/>
+            <ac:spMk id="3" creationId="{B7EE3CAF-36EB-92B0-5AA3-0C831DBCE9D5}"/>
+          </ac:spMkLst>
+        </pc:spChg>
+        <pc:picChg chg="del">
+          <ac:chgData name="Sebastian Carmona Estrada" userId="25b17a75-20fd-47cc-aa9d-c0c51ff3a059" providerId="ADAL" clId="{02D278AC-DBDF-48D9-89DD-A7F230D9DF1E}" dt="2024-02-07T04:27:24.230" v="8" actId="478"/>
+          <ac:picMkLst>
+            <pc:docMk/>
+            <pc:sldMk cId="1384288884" sldId="259"/>
+            <ac:picMk id="5" creationId="{69E55343-D801-0E34-580E-9B177CAB3CD1}"/>
+          </ac:picMkLst>
+        </pc:picChg>
       </pc:sldChg>
     </pc:docChg>
   </pc:docChgLst>
@@ -955,7 +1041,7 @@
           <a:p>
             <a:fld id="{38B9140F-A319-4113-AA77-1B2B1435EF86}" type="slidenum">
               <a:rPr lang="en-US" smtClean="0"/>
-              <a:t>‹#›</a:t>
+              <a:t>‹Nº›</a:t>
             </a:fld>
             <a:endParaRPr lang="en-US"/>
           </a:p>
@@ -1206,7 +1292,7 @@
           <a:p>
             <a:fld id="{38B9140F-A319-4113-AA77-1B2B1435EF86}" type="slidenum">
               <a:rPr lang="en-US" smtClean="0"/>
-              <a:t>‹#›</a:t>
+              <a:t>‹Nº›</a:t>
             </a:fld>
             <a:endParaRPr lang="en-US"/>
           </a:p>
@@ -1520,7 +1606,7 @@
           <a:p>
             <a:fld id="{38B9140F-A319-4113-AA77-1B2B1435EF86}" type="slidenum">
               <a:rPr lang="en-US" smtClean="0"/>
-              <a:t>‹#›</a:t>
+              <a:t>‹Nº›</a:t>
             </a:fld>
             <a:endParaRPr lang="en-US"/>
           </a:p>
@@ -1861,7 +1947,7 @@
           <a:p>
             <a:fld id="{38B9140F-A319-4113-AA77-1B2B1435EF86}" type="slidenum">
               <a:rPr lang="en-US" smtClean="0"/>
-              <a:t>‹#›</a:t>
+              <a:t>‹Nº›</a:t>
             </a:fld>
             <a:endParaRPr lang="en-US"/>
           </a:p>
@@ -2175,7 +2261,7 @@
           <a:p>
             <a:fld id="{38B9140F-A319-4113-AA77-1B2B1435EF86}" type="slidenum">
               <a:rPr lang="en-US" smtClean="0"/>
-              <a:t>‹#›</a:t>
+              <a:t>‹Nº›</a:t>
             </a:fld>
             <a:endParaRPr lang="en-US"/>
           </a:p>
@@ -2568,7 +2654,7 @@
           <a:p>
             <a:fld id="{38B9140F-A319-4113-AA77-1B2B1435EF86}" type="slidenum">
               <a:rPr lang="en-US" smtClean="0"/>
-              <a:t>‹#›</a:t>
+              <a:t>‹Nº›</a:t>
             </a:fld>
             <a:endParaRPr lang="en-US"/>
           </a:p>
@@ -2738,7 +2824,7 @@
           <a:p>
             <a:fld id="{38B9140F-A319-4113-AA77-1B2B1435EF86}" type="slidenum">
               <a:rPr lang="en-US" smtClean="0"/>
-              <a:t>‹#›</a:t>
+              <a:t>‹Nº›</a:t>
             </a:fld>
             <a:endParaRPr lang="en-US"/>
           </a:p>
@@ -2918,7 +3004,7 @@
           <a:p>
             <a:fld id="{38B9140F-A319-4113-AA77-1B2B1435EF86}" type="slidenum">
               <a:rPr lang="en-US" smtClean="0"/>
-              <a:t>‹#›</a:t>
+              <a:t>‹Nº›</a:t>
             </a:fld>
             <a:endParaRPr lang="en-US"/>
           </a:p>
@@ -3094,7 +3180,7 @@
           <a:p>
             <a:fld id="{38B9140F-A319-4113-AA77-1B2B1435EF86}" type="slidenum">
               <a:rPr lang="en-US" smtClean="0"/>
-              <a:t>‹#›</a:t>
+              <a:t>‹Nº›</a:t>
             </a:fld>
             <a:endParaRPr lang="en-US"/>
           </a:p>
@@ -3341,7 +3427,7 @@
           <a:p>
             <a:fld id="{38B9140F-A319-4113-AA77-1B2B1435EF86}" type="slidenum">
               <a:rPr lang="en-US" smtClean="0"/>
-              <a:t>‹#›</a:t>
+              <a:t>‹Nº›</a:t>
             </a:fld>
             <a:endParaRPr lang="en-US"/>
           </a:p>
@@ -3573,7 +3659,7 @@
           <a:p>
             <a:fld id="{38B9140F-A319-4113-AA77-1B2B1435EF86}" type="slidenum">
               <a:rPr lang="en-US" smtClean="0"/>
-              <a:t>‹#›</a:t>
+              <a:t>‹Nº›</a:t>
             </a:fld>
             <a:endParaRPr lang="en-US"/>
           </a:p>
@@ -3947,7 +4033,7 @@
           <a:p>
             <a:fld id="{38B9140F-A319-4113-AA77-1B2B1435EF86}" type="slidenum">
               <a:rPr lang="en-US" smtClean="0"/>
-              <a:t>‹#›</a:t>
+              <a:t>‹Nº›</a:t>
             </a:fld>
             <a:endParaRPr lang="en-US"/>
           </a:p>
@@ -4070,7 +4156,7 @@
           <a:p>
             <a:fld id="{38B9140F-A319-4113-AA77-1B2B1435EF86}" type="slidenum">
               <a:rPr lang="en-US" smtClean="0"/>
-              <a:t>‹#›</a:t>
+              <a:t>‹Nº›</a:t>
             </a:fld>
             <a:endParaRPr lang="en-US"/>
           </a:p>
@@ -4165,7 +4251,7 @@
           <a:p>
             <a:fld id="{38B9140F-A319-4113-AA77-1B2B1435EF86}" type="slidenum">
               <a:rPr lang="en-US" smtClean="0"/>
-              <a:t>‹#›</a:t>
+              <a:t>‹Nº›</a:t>
             </a:fld>
             <a:endParaRPr lang="en-US"/>
           </a:p>
@@ -4420,7 +4506,7 @@
           <a:p>
             <a:fld id="{38B9140F-A319-4113-AA77-1B2B1435EF86}" type="slidenum">
               <a:rPr lang="en-US" smtClean="0"/>
-              <a:t>‹#›</a:t>
+              <a:t>‹Nº›</a:t>
             </a:fld>
             <a:endParaRPr lang="en-US"/>
           </a:p>
@@ -4683,7 +4769,7 @@
           <a:p>
             <a:fld id="{38B9140F-A319-4113-AA77-1B2B1435EF86}" type="slidenum">
               <a:rPr lang="en-US" smtClean="0"/>
-              <a:t>‹#›</a:t>
+              <a:t>‹Nº›</a:t>
             </a:fld>
             <a:endParaRPr lang="en-US"/>
           </a:p>
@@ -5460,7 +5546,7 @@
           <a:p>
             <a:fld id="{38B9140F-A319-4113-AA77-1B2B1435EF86}" type="slidenum">
               <a:rPr lang="en-US" smtClean="0"/>
-              <a:t>‹#›</a:t>
+              <a:t>‹Nº›</a:t>
             </a:fld>
             <a:endParaRPr lang="en-US"/>
           </a:p>
@@ -6034,31 +6120,6 @@
           <a:chExt cx="0" cy="0"/>
         </a:xfrm>
       </p:grpSpPr>
-      <p:sp>
-        <p:nvSpPr>
-          <p:cNvPr id="2" name="Title 1">
-            <a:extLst>
-              <a:ext uri="{FF2B5EF4-FFF2-40B4-BE49-F238E27FC236}">
-                <a16:creationId xmlns:a16="http://schemas.microsoft.com/office/drawing/2014/main" id="{515C6F4A-9075-EBFC-2712-CC0798A12208}"/>
-              </a:ext>
-            </a:extLst>
-          </p:cNvPr>
-          <p:cNvSpPr>
-            <a:spLocks noGrp="1"/>
-          </p:cNvSpPr>
-          <p:nvPr>
-            <p:ph type="title"/>
-          </p:nvPr>
-        </p:nvSpPr>
-        <p:spPr/>
-        <p:txBody>
-          <a:bodyPr/>
-          <a:lstStyle/>
-          <a:p>
-            <a:endParaRPr lang="en-US"/>
-          </a:p>
-        </p:txBody>
-      </p:sp>
       <mc:AlternateContent xmlns:mc="http://schemas.openxmlformats.org/markup-compatibility/2006">
         <mc:Choice xmlns:we="http://schemas.microsoft.com/office/webextensions/webextension/2010/11" xmlns:pca="http://schemas.microsoft.com/office/powerpoint/2013/contentapp" Requires="we pca">
           <p:graphicFrame>
@@ -6075,11 +6136,16 @@
               </p:cNvGraphicFramePr>
               <p:nvPr>
                 <p:ph idx="1"/>
+                <p:extLst>
+                  <p:ext uri="{D42A27DB-BD31-4B8C-83A1-F6EECF244321}">
+                    <p14:modId xmlns:p14="http://schemas.microsoft.com/office/powerpoint/2010/main" val="3502080147"/>
+                  </p:ext>
+                </p:extLst>
               </p:nvPr>
             </p:nvGraphicFramePr>
             <p:xfrm>
-              <a:off x="677863" y="2160588"/>
-              <a:ext cx="8596312" cy="3881437"/>
+              <a:off x="153909" y="298764"/>
+              <a:ext cx="11688024" cy="6274052"/>
             </p:xfrm>
             <a:graphic>
               <a:graphicData uri="http://schemas.microsoft.com/office/webextensions/webextension/2010/11">
@@ -6111,8 +6177,8 @@
             </p:blipFill>
             <p:spPr>
               <a:xfrm>
-                <a:off x="677863" y="2160588"/>
-                <a:ext cx="8596312" cy="3881437"/>
+                <a:off x="153909" y="298764"/>
+                <a:ext cx="11688024" cy="6274052"/>
               </a:xfrm>
               <a:prstGeom prst="rect">
                 <a:avLst/>
@@ -6125,6 +6191,186 @@
     <p:extLst>
       <p:ext uri="{BB962C8B-B14F-4D97-AF65-F5344CB8AC3E}">
         <p14:creationId xmlns:p14="http://schemas.microsoft.com/office/powerpoint/2010/main" val="3940469421"/>
+      </p:ext>
+    </p:extLst>
+  </p:cSld>
+  <p:clrMapOvr>
+    <a:masterClrMapping/>
+  </p:clrMapOvr>
+</p:sld>
+</file>
+
+<file path=ppt/slides/slide3.xml><?xml version="1.0" encoding="utf-8"?>
+<p:sld xmlns:a="http://schemas.openxmlformats.org/drawingml/2006/main" xmlns:r="http://schemas.openxmlformats.org/officeDocument/2006/relationships" xmlns:p="http://schemas.openxmlformats.org/presentationml/2006/main">
+  <p:cSld>
+    <p:spTree>
+      <p:nvGrpSpPr>
+        <p:cNvPr id="1" name=""/>
+        <p:cNvGrpSpPr/>
+        <p:nvPr/>
+      </p:nvGrpSpPr>
+      <p:grpSpPr>
+        <a:xfrm>
+          <a:off x="0" y="0"/>
+          <a:ext cx="0" cy="0"/>
+          <a:chOff x="0" y="0"/>
+          <a:chExt cx="0" cy="0"/>
+        </a:xfrm>
+      </p:grpSpPr>
+      <p:sp>
+        <p:nvSpPr>
+          <p:cNvPr id="2" name="Título 1">
+            <a:extLst>
+              <a:ext uri="{FF2B5EF4-FFF2-40B4-BE49-F238E27FC236}">
+                <a16:creationId xmlns:a16="http://schemas.microsoft.com/office/drawing/2014/main" id="{40872462-5174-FB09-5A58-232DFA18A1F4}"/>
+              </a:ext>
+            </a:extLst>
+          </p:cNvPr>
+          <p:cNvSpPr>
+            <a:spLocks noGrp="1"/>
+          </p:cNvSpPr>
+          <p:nvPr>
+            <p:ph type="title"/>
+          </p:nvPr>
+        </p:nvSpPr>
+        <p:spPr/>
+        <p:txBody>
+          <a:bodyPr/>
+          <a:lstStyle/>
+          <a:p>
+            <a:endParaRPr lang="es-CO"/>
+          </a:p>
+        </p:txBody>
+      </p:sp>
+      <p:sp>
+        <p:nvSpPr>
+          <p:cNvPr id="3" name="Marcador de contenido 2">
+            <a:extLst>
+              <a:ext uri="{FF2B5EF4-FFF2-40B4-BE49-F238E27FC236}">
+                <a16:creationId xmlns:a16="http://schemas.microsoft.com/office/drawing/2014/main" id="{20A3EDBC-4A2F-6D46-FBBE-B6E1BC5241C4}"/>
+              </a:ext>
+            </a:extLst>
+          </p:cNvPr>
+          <p:cNvSpPr>
+            <a:spLocks noGrp="1"/>
+          </p:cNvSpPr>
+          <p:nvPr>
+            <p:ph idx="1"/>
+          </p:nvPr>
+        </p:nvSpPr>
+        <p:spPr/>
+        <p:txBody>
+          <a:bodyPr/>
+          <a:lstStyle/>
+          <a:p>
+            <a:endParaRPr lang="es-CO"/>
+          </a:p>
+        </p:txBody>
+      </p:sp>
+      <p:pic>
+        <p:nvPicPr>
+          <p:cNvPr id="5" name="Imagen 4">
+            <a:extLst>
+              <a:ext uri="{FF2B5EF4-FFF2-40B4-BE49-F238E27FC236}">
+                <a16:creationId xmlns:a16="http://schemas.microsoft.com/office/drawing/2014/main" id="{5CD9E9C9-E4E3-8230-5B93-D91124CAD387}"/>
+              </a:ext>
+            </a:extLst>
+          </p:cNvPr>
+          <p:cNvPicPr>
+            <a:picLocks noChangeAspect="1"/>
+          </p:cNvPicPr>
+          <p:nvPr/>
+        </p:nvPicPr>
+        <p:blipFill>
+          <a:blip r:embed="rId2"/>
+          <a:stretch>
+            <a:fillRect/>
+          </a:stretch>
+        </p:blipFill>
+        <p:spPr>
+          <a:xfrm>
+            <a:off x="677334" y="1190312"/>
+            <a:ext cx="11060068" cy="4477375"/>
+          </a:xfrm>
+          <a:prstGeom prst="rect">
+            <a:avLst/>
+          </a:prstGeom>
+        </p:spPr>
+      </p:pic>
+    </p:spTree>
+    <p:extLst>
+      <p:ext uri="{BB962C8B-B14F-4D97-AF65-F5344CB8AC3E}">
+        <p14:creationId xmlns:p14="http://schemas.microsoft.com/office/powerpoint/2010/main" val="3477497775"/>
+      </p:ext>
+    </p:extLst>
+  </p:cSld>
+  <p:clrMapOvr>
+    <a:masterClrMapping/>
+  </p:clrMapOvr>
+</p:sld>
+</file>
+
+<file path=ppt/slides/slide4.xml><?xml version="1.0" encoding="utf-8"?>
+<p:sld xmlns:a="http://schemas.openxmlformats.org/drawingml/2006/main" xmlns:r="http://schemas.openxmlformats.org/officeDocument/2006/relationships" xmlns:p="http://schemas.openxmlformats.org/presentationml/2006/main">
+  <p:cSld>
+    <p:spTree>
+      <p:nvGrpSpPr>
+        <p:cNvPr id="1" name="">
+          <a:extLst>
+            <a:ext uri="{FF2B5EF4-FFF2-40B4-BE49-F238E27FC236}">
+              <a16:creationId xmlns:a16="http://schemas.microsoft.com/office/drawing/2014/main" id="{B59180D3-CF5D-EC01-92D8-7A01DFA4CB87}"/>
+            </a:ext>
+          </a:extLst>
+        </p:cNvPr>
+        <p:cNvGrpSpPr/>
+        <p:nvPr/>
+      </p:nvGrpSpPr>
+      <p:grpSpPr>
+        <a:xfrm>
+          <a:off x="0" y="0"/>
+          <a:ext cx="0" cy="0"/>
+          <a:chOff x="0" y="0"/>
+          <a:chExt cx="0" cy="0"/>
+        </a:xfrm>
+      </p:grpSpPr>
+      <p:sp>
+        <p:nvSpPr>
+          <p:cNvPr id="3" name="Marcador de contenido 2">
+            <a:extLst>
+              <a:ext uri="{FF2B5EF4-FFF2-40B4-BE49-F238E27FC236}">
+                <a16:creationId xmlns:a16="http://schemas.microsoft.com/office/drawing/2014/main" id="{B7EE3CAF-36EB-92B0-5AA3-0C831DBCE9D5}"/>
+              </a:ext>
+            </a:extLst>
+          </p:cNvPr>
+          <p:cNvSpPr>
+            <a:spLocks noGrp="1"/>
+          </p:cNvSpPr>
+          <p:nvPr>
+            <p:ph idx="1"/>
+          </p:nvPr>
+        </p:nvSpPr>
+        <p:spPr>
+          <a:xfrm>
+            <a:off x="4777883" y="3009351"/>
+            <a:ext cx="2636234" cy="419649"/>
+          </a:xfrm>
+        </p:spPr>
+        <p:txBody>
+          <a:bodyPr/>
+          <a:lstStyle/>
+          <a:p>
+            <a:r>
+              <a:rPr lang="es-MX" dirty="0"/>
+              <a:t>MUCHAS GRACIAS</a:t>
+            </a:r>
+            <a:endParaRPr lang="es-CO" dirty="0"/>
+          </a:p>
+        </p:txBody>
+      </p:sp>
+    </p:spTree>
+    <p:extLst>
+      <p:ext uri="{BB962C8B-B14F-4D97-AF65-F5344CB8AC3E}">
+        <p14:creationId xmlns:p14="http://schemas.microsoft.com/office/powerpoint/2010/main" val="1384288884"/>
       </p:ext>
     </p:extLst>
   </p:cSld>
@@ -6399,6 +6645,21 @@
   </we:alternateReferences>
   <we:properties>
     <we:property name="pptInsertionSessionID" value="&quot;BC531107-99B4-438F-8330-BEE0B201A8EB&quot;"/>
+    <we:property name="reportUrl" value="&quot;/links/TpMlXQ6xZk?ctid=99f7b55e-9cbe-467b-8143-919782918afb&amp;pbi_source=linkShare&amp;fromEntryPoint=share&quot;"/>
+    <we:property name="reportName" value="&quot;prueba 2&quot;"/>
+    <we:property name="reportState" value="&quot;CONNECTED&quot;"/>
+    <we:property name="embedUrl" value="&quot;/reportEmbed?reportId=7fad957f-89e7-4fab-bff9-2753586acc29&amp;config=eyJjbHVzdGVyVXJsIjoiaHR0cHM6Ly9XQUJJLVNPVVRILUNFTlRSQUwtVVMtQi1QUklNQVJZLXJlZGlyZWN0LmFuYWx5c2lzLndpbmRvd3MubmV0IiwiZW1iZWRGZWF0dXJlcyI6eyJ1c2FnZU1ldHJpY3NWTmV4dCI6dHJ1ZSwiZGlzYWJsZUFuZ3VsYXJKU0Jvb3RzdHJhcFJlcG9ydEVtYmVkIjp0cnVlfX0%3D&amp;disableSensitivityBanner=true&amp;lrtl=1&quot;"/>
+    <we:property name="pageDisplayName" value="&quot;Página 1&quot;"/>
+    <we:property name="datasetId" value="&quot;7a155d9f-5d0c-4733-96ca-e8633e8aadb6&quot;"/>
+    <we:property name="backgroundColor" value="&quot;#FFFFFF&quot;"/>
+    <we:property name="bookmark" value="&quot;H4sIAAAAAAAAA+VZzVLjOBB+lZQvXBJKku044cbf7M4O7FLAsoctimpL7eAZx87INjNZKo+0p32EebFtyfFAQggkkEyoqaLAltqt/rr7a0nNraPifJDA8Hfoo7PjHIOWoDLd4E7TSauxvSz71Af9yQMphAcuD5VABgpd6ZJUNijiLM2dnVunAN3D4iLOS0iMQhr8+7LpQJKcQM+8RZDk2HQGqPMshST+Bythmip0iaOmg18HSabBqDwroECj9obE6Z1M4dtmRZBFfINnKItq9BQHmS7q96aTV0/WpMk5GojipCB95jEcHn4daLLxtob6zk4qFaIPXdYJwVeRajMhjTuK4cDI7JNVvUzHEhIarNQZbRe1laLpvNNZ3+oduzUiycO0iIuhWeTPxh+nB4enZ41Wo8C8kGWINH9u1bMROeyva9Rov9/PUhXXpr+3v43NmOcVQCuSlP2pGfN2lpVa4ilGdy/WkhF5+URnFANrTU5eLnMapXUvIClt0EjtUUy4CKJBZoZJdEtmaRTrPqotI385ol9VyO4t+yxz5vviMQubznX2ZV8jBUA5O9wufmPzh9xUQJyO4yowZFGHh0y6Qvhtzj0VPR76mWFdNSaFCaWwHl4pk+PT0JiFlsdpLxkTxNLAPlVp4uRJLCnviH7hR0puC6qPRD/z0MO0ih3BG1SLxpjfuWDyafWJu5sq8+cIo6JyZ38AOs5r59ZvH2IjR1bcCb4otR86+TTuXVvNM7LbCBVxH7cEE7zF3BYT54zt2B+T7xPfz4fgbgaEdkt0pyBYyo4s2UkYZmQIsU0XB+PKi5Yky7mLSJSqxRWR0Z1pRf1MPaVlaw+LL4jpGOal+SzTCvXe0II8iHW9B/DmVCxWT2/j72rXIqGP97an7xV3HVZcWmeyDrihByEPeCS45wZuBG+sOja/27WrbiCVNDpt1G6vp7EHdQVadcBlEmNaXNmMu4qVnX5XpuOME/MgvL5rGweH57vvj+aYS5RXV7JaeLjM9pPQZrt/TZViYgd6G5zbr3Gvk3UBawfot5lUTAShq6DjBT+AdWtIjbknk0c2nWcVeMhjeb+8r6agLu6hKsChH/lSyVCEHRFCAG1Ab2MDXMriyl55NqW2Pm325xKqjyZLK1siQ0PQi9QuMV27Ngz/KgvdwulUkcELpB+FAKEKJQefo+q+rNr9GlM90PJ6eIQ3mDxE8X3+4VRt6wWd0Ku+wvi0/cKSP74hWbUy/vaf6TzMPcPcs9H5zTx+Lr/9Cw2FjQjlNVQ33DE+5xgf3nifRc6fzlMHNLWufWqpG43fYnypG839Dc90tZK6Is24tBFtijML98zKPaHcNuIW2Et/uqyq+Ddub0Ga1/3Iyh06S+xT7SIKT2I+rGY/l7Qu4bASs+zfnjBu+w7C9iy7to+rFeKcangCg9wkuGmX0pBC66cPOFzmzHOUUa01CX0OYYJXURAyECFveYxDywOOrW6nE7U6CBiBCqJIiunyP/aTse4kTtPaNFOpXtsNluiP+GFycRLSWWY5UHuozuW0TJJxzgedCCNXcJBBl6nI7yrftWSaVzXA0mOvLArbar53fjAq26EbcYaeZJEfeKHoeuE6T/n7R8+4qWZlWujhfn2U+DlO94t7pjrIdD2faMBc8LjHETwKq/tkQN9GU8Jfb1NihTk5iBfqRazjPP+isPyozsUsAgTKjcJASD9kruj4gUD36W7howQ4RshLvfDe//Qt5Jfji2UyR4JWy2bNirFUVTACjwkfPBl1ueSyI91udyPqz3MKaplTgpflc9qhK43U5sCugio9YhJKJYWMpK86wH3ciKCupNP9VkL7KuCrAHPBlVKccTeAtvK7jAY2KsBPFyEEnVLQ8ldot21YfF+Cvfrn6Wj26Tcri3wAEk8gxVm9A3OPVKgWupmPRv8DAWTzWKIjAAA=&quot;"/>
+    <we:property name="initialStateBookmark" value="&quot;H4sIAAAAAAAAA+Va21LjOBD9lZRfeEkoX+OENwjM7ixkoIBlH7aoVFtqBU05dka2mclO5ZP2aT9hfmxbcswlhNwgTKipooIstVt9+iZ1J98tLrNhDKNPMEBrz+qCYsBTVXOsupWUcwenp8fd/fPj3qf97hFNp8Ncpklm7X23clB9zK9kVkCsOdDk39d1C+L4DPr6SUCcYd0aosrSBGL5D5bEtJSrAsd1C78N41SBZnmRQ46a7S2R0zPt7ex6tCOwXN7iBbK8nD3HYary6rluZeXIiPR4jSaEjHPip4fR6OjbUJGM3ytsH8wi5xEG0LZbEQRc8KbtMo0/Hw01TYek6qdKMohpsmSnuV1VUrp164NKB4bvRI+CKI+SXOYjvcmftdPzw6Pzi1qjlmOWsyJCWr807O0xKeyvG1Ro3u+kCZeV6B/Np5YZs6wEaEjiYjC1op8u0kIxPEdx/2AkGZOWz1RKNjDSZKTlIqNZ2vcK4sIYjdieSMJFEDUyPU2kOyxNhFQD5Dua/npMH6XJHmy7lDjzdfGchHXrJv3aUUgG4NaeYza/Nf5DaspBJhO7uhjZouVENvNcN2g6js/F86afadZNY+IYkwurUY9rH5+GZhtomUz68SRATBiYUekmVhZLRn5H4Rd9Juc2oAZI4acHfUxK2xG8YbmpxOxeBY9Hm3fc/YTrfyco8lKdgyEomVXKrZ6OpaYjKe4JX+TaT5V8Lvs3hvMM79ZEuRzgjmu7TsP2GrZ7adt75k/7+6P350PwtgNCs+G2pyCYkB2bYCdimOEhFG0qP5xkXjRBsp66KIgSvjojEro1zWiQ8kVcdg4w/4qYTGBe69dSxVEdjAzIQ6mqM8CpT9li8+Gt9V2eWkT0+cHxdJdx30KKa6NMuwVe5EPkhI5wHd8LPQHvLDvW7+Ta57eQMJqdFmq/31fYhyoDbdrgLJaY5D3jcT3JzfKHIpl4nDsPwuurtnZ4dLn/8WSOuBTyvMfKjUfrHD8xHbadG8oUj06g9xFznQr3W0ZdaDdDDJo247YbRh6Hlh/+hKh7A9eYezN55tBZKsFDJtnD9L6ZhLq6hkoDR4EIGGeRG7XcCEJoAvpba+CC5T1T8mxLbl0s9pcCypcep1Z7DQ+NQK2Su9zp3LVl+DeZ6FZ2pzIY/JAFIgKIeMQcCBzk7Zdlu98l5QPFbkYneIvxUxR360+XKlmv6IZe9hUmt+0XpvxJhWTYMvnjP915mHuHeSCj9Ycefil+/As1jjWB7AbKCneCz+ri04p3qeD85TR1SEtvdU6tVdEEDdtZq6J5eODprlZcZaQZRRuFTX5h4F4YugXMTSNuhbP0l/OqMv4m7S1IsqofWapDpbEZVSoi88T6xXL1S0H7Eg5DMUv+3UfC7d5D2J0l12633EFmlMNjGGbawXW7lKY4Gj0d42idO89JSrlWO/QlRDH2RBjZ4EZOw7cdaPjgYKPdaolGCwEF8FAI5k6n/4metHRnMkkq0XSmem01mEB/Rg+PNycilaYmBioNVb6cFHE88fmwJVB4rgMsbNtcBG0eeCaY5mUNMOFxUOS5aTU/uD9ols3IE46NPrNFEPqR2/ajt7zld06WqFTTIsnVqFNdJX6N2/3qmikvMm0/oDCwPfAd30HwyazeQoO+j6ZE8LZNiQ365FCu1It4i/v8i8zyszoXswIg5J6IQpcFke25rSB00VvcLXw2ALoIWaFWPvsXVyG/da/W8RwGiq/rNRvGUmZBAb7tBuAz0XaYw1rMa7e3Iv8sk1CLjBy8KJZph27UUtsDuzQq8ymSkHHmMsEC3gInwK0w6kY63e/FtK8CvjSw4zqcc8d2vBCaPGjbNLFVBl6chBBUQkbLXqHdtmX2fQn28svT8ezbb1rk2RAYnkGCs3oHuo7kyJetzM1vGyTVZQte0BXP3b15PP4frc3/rMMjAAA=&quot;"/>
+    <we:property name="isFiltersActionButtonVisible" value="true"/>
+    <we:property name="isVisualContainerHeaderHidden" value="false"/>
+    <we:property name="reportEmbeddedTime" value="&quot;2024-02-07T04:24:21.936Z&quot;"/>
+    <we:property name="creatorTenantId" value="&quot;99f7b55e-9cbe-467b-8143-919782918afb&quot;"/>
+    <we:property name="creatorUserId" value="&quot;10033FFFA20A04C3&quot;"/>
+    <we:property name="creatorSessionId" value="&quot;2c4b0cb0-68dd-478e-a820-a0a1871d286e&quot;"/>
   </we:properties>
   <we:bindings/>
   <we:snapshot xmlns:r="http://schemas.openxmlformats.org/officeDocument/2006/relationships" r:embed="rId1"/>

</xml_diff>